<commit_message>
- Week 6 content update
</commit_message>
<xml_diff>
--- a/lectures/week4/lecture2/slides/week4_lecture2.pptx
+++ b/lectures/week4/lecture2/slides/week4_lecture2.pptx
@@ -2052,6 +2052,193 @@
           </a:p>
         </p:txBody>
       </p:sp>
+      <p:sp>
+        <p:nvSpPr>
+          <p:cNvPr id="4" name="TextBox 3">
+            <a:extLst>
+              <a:ext uri="{FF2B5EF4-FFF2-40B4-BE49-F238E27FC236}">
+                <a16:creationId xmlns:a16="http://schemas.microsoft.com/office/drawing/2014/main" id="{BD441628-1639-56F1-28F9-18ADBFAF951B}"/>
+              </a:ext>
+            </a:extLst>
+          </p:cNvPr>
+          <p:cNvSpPr txBox="1"/>
+          <p:nvPr/>
+        </p:nvSpPr>
+        <p:spPr>
+          <a:xfrm>
+            <a:off x="335947" y="5102715"/>
+            <a:ext cx="6619392" cy="1569660"/>
+          </a:xfrm>
+          <a:prstGeom prst="rect">
+            <a:avLst/>
+          </a:prstGeom>
+          <a:noFill/>
+        </p:spPr>
+        <p:txBody>
+          <a:bodyPr wrap="square" rtlCol="0">
+            <a:spAutoFit/>
+          </a:bodyPr>
+          <a:lstStyle/>
+          <a:p>
+            <a:r>
+              <a:rPr lang="en-US" sz="1600" b="1" dirty="0">
+                <a:solidFill>
+                  <a:srgbClr val="CC99FF"/>
+                </a:solidFill>
+              </a:rPr>
+              <a:t>Upcoming</a:t>
+            </a:r>
+          </a:p>
+          <a:p>
+            <a:pPr marL="285750" indent="-285750">
+              <a:buClr>
+                <a:srgbClr val="CC99FF"/>
+              </a:buClr>
+              <a:buFont typeface="Wingdings" panose="05000000000000000000" pitchFamily="2" charset="2"/>
+              <a:buChar char="§"/>
+            </a:pPr>
+            <a:r>
+              <a:rPr lang="en-US" sz="1600" dirty="0">
+                <a:solidFill>
+                  <a:srgbClr val="66FF99"/>
+                </a:solidFill>
+              </a:rPr>
+              <a:t>Lab 2 Due 11:59 pm Friday</a:t>
+            </a:r>
+            <a:r>
+              <a:rPr lang="en-US" sz="1600" dirty="0">
+                <a:solidFill>
+                  <a:srgbClr val="CC99FF"/>
+                </a:solidFill>
+              </a:rPr>
+              <a:t>.</a:t>
+            </a:r>
+            <a:endParaRPr lang="en-US" sz="1600" dirty="0">
+              <a:solidFill>
+                <a:srgbClr val="66FF99"/>
+              </a:solidFill>
+            </a:endParaRPr>
+          </a:p>
+          <a:p>
+            <a:pPr marL="285750" indent="-285750">
+              <a:buClr>
+                <a:srgbClr val="CC99FF"/>
+              </a:buClr>
+              <a:buFont typeface="Wingdings" panose="05000000000000000000" pitchFamily="2" charset="2"/>
+              <a:buChar char="§"/>
+            </a:pPr>
+            <a:r>
+              <a:rPr lang="en-US" sz="1600" dirty="0">
+                <a:solidFill>
+                  <a:srgbClr val="66FF99"/>
+                </a:solidFill>
+              </a:rPr>
+              <a:t>No new lab released this Thursday</a:t>
+            </a:r>
+            <a:r>
+              <a:rPr lang="en-US" sz="1600" dirty="0">
+                <a:solidFill>
+                  <a:srgbClr val="CC99FF"/>
+                </a:solidFill>
+              </a:rPr>
+              <a:t>.</a:t>
+            </a:r>
+            <a:endParaRPr lang="en-US" sz="1600" dirty="0">
+              <a:solidFill>
+                <a:srgbClr val="66FF99"/>
+              </a:solidFill>
+            </a:endParaRPr>
+          </a:p>
+          <a:p>
+            <a:pPr marL="285750" indent="-285750">
+              <a:buClr>
+                <a:srgbClr val="CC99FF"/>
+              </a:buClr>
+              <a:buFont typeface="Wingdings" panose="05000000000000000000" pitchFamily="2" charset="2"/>
+              <a:buChar char="§"/>
+            </a:pPr>
+            <a:r>
+              <a:rPr lang="en-US" sz="1600" dirty="0">
+                <a:solidFill>
+                  <a:srgbClr val="66FF99"/>
+                </a:solidFill>
+              </a:rPr>
+              <a:t>Reflection 4 Released Friday 6:00 pm</a:t>
+            </a:r>
+            <a:r>
+              <a:rPr lang="en-US" sz="1600" dirty="0">
+                <a:solidFill>
+                  <a:srgbClr val="CC99FF"/>
+                </a:solidFill>
+              </a:rPr>
+              <a:t>.</a:t>
+            </a:r>
+            <a:endParaRPr lang="en-US" sz="1600" dirty="0">
+              <a:solidFill>
+                <a:srgbClr val="66FF99"/>
+              </a:solidFill>
+            </a:endParaRPr>
+          </a:p>
+          <a:p>
+            <a:pPr marL="285750" indent="-285750">
+              <a:buClr>
+                <a:srgbClr val="CC99FF"/>
+              </a:buClr>
+              <a:buFont typeface="Wingdings" panose="05000000000000000000" pitchFamily="2" charset="2"/>
+              <a:buChar char="§"/>
+            </a:pPr>
+            <a:r>
+              <a:rPr lang="en-US" sz="1600" dirty="0">
+                <a:solidFill>
+                  <a:srgbClr val="66FF99"/>
+                </a:solidFill>
+              </a:rPr>
+              <a:t>Midterm Review (Online) tonight 6 – 7 pm</a:t>
+            </a:r>
+            <a:r>
+              <a:rPr lang="en-US" sz="1600" dirty="0">
+                <a:solidFill>
+                  <a:srgbClr val="CC99FF"/>
+                </a:solidFill>
+              </a:rPr>
+              <a:t>.</a:t>
+            </a:r>
+          </a:p>
+          <a:p>
+            <a:pPr marL="285750" indent="-285750">
+              <a:buClr>
+                <a:srgbClr val="CC99FF"/>
+              </a:buClr>
+              <a:buFont typeface="Wingdings" panose="05000000000000000000" pitchFamily="2" charset="2"/>
+              <a:buChar char="§"/>
+            </a:pPr>
+            <a:r>
+              <a:rPr lang="en-US" sz="1600" b="1" dirty="0">
+                <a:solidFill>
+                  <a:srgbClr val="CC99FF"/>
+                </a:solidFill>
+              </a:rPr>
+              <a:t>Term Test 1 </a:t>
+            </a:r>
+            <a:r>
+              <a:rPr lang="en-US" sz="1600" dirty="0">
+                <a:solidFill>
+                  <a:srgbClr val="66FF99"/>
+                </a:solidFill>
+              </a:rPr>
+              <a:t>next week</a:t>
+            </a:r>
+            <a:r>
+              <a:rPr lang="en-US" sz="1600" dirty="0">
+                <a:solidFill>
+                  <a:srgbClr val="CC99FF"/>
+                </a:solidFill>
+              </a:rPr>
+              <a:t>.</a:t>
+            </a:r>
+          </a:p>
+        </p:txBody>
+      </p:sp>
     </p:spTree>
     <p:extLst>
       <p:ext uri="{BB962C8B-B14F-4D97-AF65-F5344CB8AC3E}">

</xml_diff>